<commit_message>
[add] something somewhere somehow
</commit_message>
<xml_diff>
--- a/SE-227/slides/CSE-15 Before-of-after.pptx
+++ b/SE-227/slides/CSE-15 Before-of-after.pptx
@@ -278,7 +278,7 @@
           <a:p>
             <a:fld id="{FD384E5B-0B7C-A143-A087-04B582FC4BEF}" type="datetimeFigureOut">
               <a:rPr kumimoji="1" lang="zh-CN" altLang="en-US" smtClean="0"/>
-              <a:t>2019/11/7</a:t>
+              <a:t>2019/12/23</a:t>
             </a:fld>
             <a:endParaRPr kumimoji="1" lang="zh-CN" altLang="en-US"/>
           </a:p>
@@ -443,7 +443,7 @@
           <a:p>
             <a:fld id="{A2D7DB94-E0DE-4F0F-A9B7-54654CD8C8B1}" type="datetimeFigureOut">
               <a:rPr lang="zh-CN" altLang="en-US" smtClean="0"/>
-              <a:t>2019/11/7</a:t>
+              <a:t>2019/12/23</a:t>
             </a:fld>
             <a:endParaRPr lang="zh-CN" altLang="en-US"/>
           </a:p>
@@ -2207,7 +2207,7 @@
           <a:p>
             <a:fld id="{66A7A40B-EA42-4A59-BDB5-85EFA65BC5FC}" type="datetimeFigureOut">
               <a:rPr lang="zh-CN" altLang="en-US" smtClean="0"/>
-              <a:t>2019/11/7</a:t>
+              <a:t>2019/12/23</a:t>
             </a:fld>
             <a:endParaRPr lang="zh-CN" altLang="en-US" dirty="0"/>
           </a:p>
@@ -2375,7 +2375,7 @@
           <a:p>
             <a:fld id="{66A7A40B-EA42-4A59-BDB5-85EFA65BC5FC}" type="datetimeFigureOut">
               <a:rPr lang="zh-CN" altLang="en-US" smtClean="0"/>
-              <a:t>2019/11/7</a:t>
+              <a:t>2019/12/23</a:t>
             </a:fld>
             <a:endParaRPr lang="zh-CN" altLang="en-US"/>
           </a:p>
@@ -2553,7 +2553,7 @@
           <a:p>
             <a:fld id="{66A7A40B-EA42-4A59-BDB5-85EFA65BC5FC}" type="datetimeFigureOut">
               <a:rPr lang="zh-CN" altLang="en-US" smtClean="0"/>
-              <a:t>2019/11/7</a:t>
+              <a:t>2019/12/23</a:t>
             </a:fld>
             <a:endParaRPr lang="zh-CN" altLang="en-US"/>
           </a:p>
@@ -2789,7 +2789,7 @@
           <a:p>
             <a:fld id="{66A7A40B-EA42-4A59-BDB5-85EFA65BC5FC}" type="datetimeFigureOut">
               <a:rPr lang="zh-CN" altLang="en-US" smtClean="0"/>
-              <a:t>2019/11/7</a:t>
+              <a:t>2019/12/23</a:t>
             </a:fld>
             <a:endParaRPr lang="zh-CN" altLang="en-US"/>
           </a:p>
@@ -3081,7 +3081,7 @@
           <a:p>
             <a:fld id="{66A7A40B-EA42-4A59-BDB5-85EFA65BC5FC}" type="datetimeFigureOut">
               <a:rPr lang="zh-CN" altLang="en-US" smtClean="0"/>
-              <a:t>2019/11/7</a:t>
+              <a:t>2019/12/23</a:t>
             </a:fld>
             <a:endParaRPr lang="zh-CN" altLang="en-US"/>
           </a:p>
@@ -3412,7 +3412,7 @@
           <a:p>
             <a:fld id="{66A7A40B-EA42-4A59-BDB5-85EFA65BC5FC}" type="datetimeFigureOut">
               <a:rPr lang="zh-CN" altLang="en-US" smtClean="0"/>
-              <a:t>2019/11/7</a:t>
+              <a:t>2019/12/23</a:t>
             </a:fld>
             <a:endParaRPr lang="zh-CN" altLang="en-US"/>
           </a:p>
@@ -3831,7 +3831,7 @@
           <a:p>
             <a:fld id="{66A7A40B-EA42-4A59-BDB5-85EFA65BC5FC}" type="datetimeFigureOut">
               <a:rPr lang="zh-CN" altLang="en-US" smtClean="0"/>
-              <a:t>2019/11/7</a:t>
+              <a:t>2019/12/23</a:t>
             </a:fld>
             <a:endParaRPr lang="zh-CN" altLang="en-US"/>
           </a:p>
@@ -3948,7 +3948,7 @@
           <a:p>
             <a:fld id="{66A7A40B-EA42-4A59-BDB5-85EFA65BC5FC}" type="datetimeFigureOut">
               <a:rPr lang="zh-CN" altLang="en-US" smtClean="0"/>
-              <a:t>2019/11/7</a:t>
+              <a:t>2019/12/23</a:t>
             </a:fld>
             <a:endParaRPr lang="zh-CN" altLang="en-US"/>
           </a:p>
@@ -4043,7 +4043,7 @@
           <a:p>
             <a:fld id="{66A7A40B-EA42-4A59-BDB5-85EFA65BC5FC}" type="datetimeFigureOut">
               <a:rPr lang="zh-CN" altLang="en-US" smtClean="0"/>
-              <a:t>2019/11/7</a:t>
+              <a:t>2019/12/23</a:t>
             </a:fld>
             <a:endParaRPr lang="zh-CN" altLang="en-US"/>
           </a:p>
@@ -4318,7 +4318,7 @@
           <a:p>
             <a:fld id="{66A7A40B-EA42-4A59-BDB5-85EFA65BC5FC}" type="datetimeFigureOut">
               <a:rPr lang="zh-CN" altLang="en-US" smtClean="0"/>
-              <a:t>2019/11/7</a:t>
+              <a:t>2019/12/23</a:t>
             </a:fld>
             <a:endParaRPr lang="zh-CN" altLang="en-US"/>
           </a:p>
@@ -4573,7 +4573,7 @@
           <a:p>
             <a:fld id="{66A7A40B-EA42-4A59-BDB5-85EFA65BC5FC}" type="datetimeFigureOut">
               <a:rPr lang="zh-CN" altLang="en-US" smtClean="0"/>
-              <a:t>2019/11/7</a:t>
+              <a:t>2019/12/23</a:t>
             </a:fld>
             <a:endParaRPr lang="zh-CN" altLang="en-US"/>
           </a:p>
@@ -4788,7 +4788,7 @@
             <a:fld id="{66A7A40B-EA42-4A59-BDB5-85EFA65BC5FC}" type="datetimeFigureOut">
               <a:rPr lang="zh-CN" altLang="en-US" smtClean="0"/>
               <a:pPr/>
-              <a:t>2019/11/7</a:t>
+              <a:t>2019/12/23</a:t>
             </a:fld>
             <a:endParaRPr lang="zh-CN" altLang="en-US" dirty="0"/>
           </a:p>
@@ -5522,7 +5522,7 @@
           <a:noFill/>
           <a:extLst>
             <a:ext uri="{909E8E84-426E-40dd-AFC4-6F175D3DCCD1}">
-              <a14:hiddenFill xmlns:a14="http://schemas.microsoft.com/office/drawing/2010/main" xmlns="">
+              <a14:hiddenFill xmlns="" xmlns:a14="http://schemas.microsoft.com/office/drawing/2010/main">
                 <a:solidFill>
                   <a:srgbClr val="FFFFFF"/>
                 </a:solidFill>
@@ -6692,7 +6692,7 @@
                   <a:schemeClr val="accent2"/>
                 </a:solidFill>
               </a:rPr>
-              <a:t>appears</a:t>
+              <a:t>appeared</a:t>
             </a:r>
             <a:r>
               <a:rPr lang="en-US" altLang="zh-CN" dirty="0"/>
@@ -11421,7 +11421,12 @@
             <p:ph idx="1"/>
           </p:nvPr>
         </p:nvSpPr>
-        <p:spPr/>
+        <p:spPr>
+          <a:xfrm>
+            <a:off x="457200" y="1333501"/>
+            <a:ext cx="8229600" cy="3771636"/>
+          </a:xfrm>
+        </p:spPr>
         <p:txBody>
           <a:bodyPr/>
           <a:lstStyle/>
@@ -12119,14 +12124,14 @@
           <a:ln/>
           <a:extLst>
             <a:ext uri="{909E8E84-426E-40dd-AFC4-6F175D3DCCD1}">
-              <a14:hiddenFill xmlns:a14="http://schemas.microsoft.com/office/drawing/2010/main" xmlns="">
+              <a14:hiddenFill xmlns="" xmlns:a14="http://schemas.microsoft.com/office/drawing/2010/main">
                 <a:solidFill>
                   <a:srgbClr val="FFFFFF"/>
                 </a:solidFill>
               </a14:hiddenFill>
             </a:ext>
             <a:ext uri="{91240B29-F687-4f45-9708-019B960494DF}">
-              <a14:hiddenLine xmlns:a14="http://schemas.microsoft.com/office/drawing/2010/main" xmlns="" w="9525">
+              <a14:hiddenLine xmlns="" xmlns:a14="http://schemas.microsoft.com/office/drawing/2010/main" w="9525">
                 <a:solidFill>
                   <a:srgbClr val="000000"/>
                 </a:solidFill>
@@ -12310,14 +12315,14 @@
           </a:ln>
           <a:extLst>
             <a:ext uri="{909E8E84-426E-40dd-AFC4-6F175D3DCCD1}">
-              <a14:hiddenFill xmlns:a14="http://schemas.microsoft.com/office/drawing/2010/main" xmlns="">
+              <a14:hiddenFill xmlns="" xmlns:a14="http://schemas.microsoft.com/office/drawing/2010/main">
                 <a:solidFill>
                   <a:srgbClr val="FFFFFF"/>
                 </a:solidFill>
               </a14:hiddenFill>
             </a:ext>
             <a:ext uri="{91240B29-F687-4f45-9708-019B960494DF}">
-              <a14:hiddenLine xmlns:a14="http://schemas.microsoft.com/office/drawing/2010/main" xmlns="" w="9525">
+              <a14:hiddenLine xmlns="" xmlns:a14="http://schemas.microsoft.com/office/drawing/2010/main" w="9525">
                 <a:solidFill>
                   <a:srgbClr val="000000"/>
                 </a:solidFill>
@@ -21823,7 +21828,7 @@
         </p:spPr>
         <p:txBody>
           <a:bodyPr>
-            <a:normAutofit fontScale="85000" lnSpcReduction="20000"/>
+            <a:normAutofit fontScale="62500" lnSpcReduction="20000"/>
           </a:bodyPr>
           <a:lstStyle/>
           <a:p>
@@ -21881,7 +21886,56 @@
               <a:rPr lang="en-US" altLang="zh-CN" sz="2400" dirty="0"/>
               <a:t>: why shouldn't we allow this schedule?</a:t>
             </a:r>
-            <a:endParaRPr lang="zh-CN" altLang="en-US" sz="2400" dirty="0"/>
+          </a:p>
+          <a:p>
+            <a:r>
+              <a:rPr lang="en-US" altLang="zh-TW" sz="2400" dirty="0"/>
+              <a:t>Answer: </a:t>
+            </a:r>
+            <a:r>
+              <a:rPr lang="zh-TW" altLang="en-US" sz="2400" dirty="0"/>
+              <a:t>导致了</a:t>
+            </a:r>
+            <a:r>
+              <a:rPr lang="en-US" altLang="zh-TW" sz="2400" dirty="0"/>
+              <a:t> T1</a:t>
+            </a:r>
+            <a:r>
+              <a:rPr lang="zh-CN" altLang="en-US" sz="2400" dirty="0"/>
+              <a:t> </a:t>
+            </a:r>
+            <a:r>
+              <a:rPr lang="zh-TW" altLang="en-US" sz="2400" dirty="0"/>
+              <a:t>的</a:t>
+            </a:r>
+            <a:r>
+              <a:rPr lang="zh-CN" altLang="en-US" sz="2400" dirty="0"/>
+              <a:t> </a:t>
+            </a:r>
+            <a:r>
+              <a:rPr lang="en-US" altLang="zh-CN" sz="2400" dirty="0"/>
+              <a:t>r/w</a:t>
+            </a:r>
+            <a:r>
+              <a:rPr lang="zh-CN" altLang="en-US" sz="2400" dirty="0"/>
+              <a:t> </a:t>
+            </a:r>
+            <a:r>
+              <a:rPr lang="zh-TW" altLang="en-US" sz="2400" dirty="0"/>
+              <a:t>不一致</a:t>
+            </a:r>
+            <a:r>
+              <a:rPr lang="zh-CN" altLang="en-US" sz="2400" dirty="0"/>
+              <a:t>。</a:t>
+            </a:r>
+            <a:r>
+              <a:rPr lang="zh-TW" altLang="en-US" sz="2400" dirty="0"/>
+              <a:t>可能产生问题</a:t>
+            </a:r>
+            <a:r>
+              <a:rPr lang="zh-CN" altLang="en-US" sz="2400" dirty="0"/>
+              <a:t>。</a:t>
+            </a:r>
           </a:p>
         </p:txBody>
       </p:sp>
@@ -21925,7 +21979,9 @@
             <p:ph type="title"/>
           </p:nvPr>
         </p:nvSpPr>
-        <p:spPr/>
+        <p:spPr>
+          <a:noFill/>
+        </p:spPr>
         <p:txBody>
           <a:bodyPr/>
           <a:lstStyle/>
@@ -21948,7 +22004,12 @@
             <p:ph idx="1"/>
           </p:nvPr>
         </p:nvSpPr>
-        <p:spPr/>
+        <p:spPr>
+          <a:xfrm>
+            <a:off x="457200" y="1333500"/>
+            <a:ext cx="8229600" cy="4152633"/>
+          </a:xfrm>
+        </p:spPr>
         <p:txBody>
           <a:bodyPr>
             <a:noAutofit/>
@@ -24838,14 +24899,14 @@
           <a:ln/>
           <a:extLst>
             <a:ext uri="{909E8E84-426E-40dd-AFC4-6F175D3DCCD1}">
-              <a14:hiddenFill xmlns="" xmlns:a14="http://schemas.microsoft.com/office/drawing/2010/main">
+              <a14:hiddenFill xmlns:a14="http://schemas.microsoft.com/office/drawing/2010/main" xmlns="">
                 <a:solidFill>
                   <a:srgbClr val="FFFFFF"/>
                 </a:solidFill>
               </a14:hiddenFill>
             </a:ext>
             <a:ext uri="{91240B29-F687-4f45-9708-019B960494DF}">
-              <a14:hiddenLine xmlns="" xmlns:a14="http://schemas.microsoft.com/office/drawing/2010/main" w="9525">
+              <a14:hiddenLine xmlns:a14="http://schemas.microsoft.com/office/drawing/2010/main" xmlns="" w="9525">
                 <a:solidFill>
                   <a:srgbClr val="000000"/>
                 </a:solidFill>
@@ -25229,14 +25290,14 @@
           <a:ln/>
           <a:extLst>
             <a:ext uri="{909E8E84-426E-40dd-AFC4-6F175D3DCCD1}">
-              <a14:hiddenFill xmlns="" xmlns:a14="http://schemas.microsoft.com/office/drawing/2010/main">
+              <a14:hiddenFill xmlns:a14="http://schemas.microsoft.com/office/drawing/2010/main" xmlns="">
                 <a:solidFill>
                   <a:srgbClr val="FFFFFF"/>
                 </a:solidFill>
               </a14:hiddenFill>
             </a:ext>
             <a:ext uri="{91240B29-F687-4f45-9708-019B960494DF}">
-              <a14:hiddenLine xmlns="" xmlns:a14="http://schemas.microsoft.com/office/drawing/2010/main" w="9525">
+              <a14:hiddenLine xmlns:a14="http://schemas.microsoft.com/office/drawing/2010/main" xmlns="" w="9525">
                 <a:solidFill>
                   <a:srgbClr val="000000"/>
                 </a:solidFill>
@@ -25411,14 +25472,14 @@
           <a:effectLst/>
           <a:extLst>
             <a:ext uri="{909E8E84-426E-40dd-AFC4-6F175D3DCCD1}">
-              <a14:hiddenFill xmlns="" xmlns:a14="http://schemas.microsoft.com/office/drawing/2010/main">
+              <a14:hiddenFill xmlns:a14="http://schemas.microsoft.com/office/drawing/2010/main" xmlns="">
                 <a:solidFill>
                   <a:schemeClr val="accent1"/>
                 </a:solidFill>
               </a14:hiddenFill>
             </a:ext>
             <a:ext uri="{91240B29-F687-4f45-9708-019B960494DF}">
-              <a14:hiddenLine xmlns="" xmlns:a14="http://schemas.microsoft.com/office/drawing/2010/main" w="9525">
+              <a14:hiddenLine xmlns:a14="http://schemas.microsoft.com/office/drawing/2010/main" xmlns="" w="9525">
                 <a:solidFill>
                   <a:schemeClr val="tx1"/>
                 </a:solidFill>
@@ -25428,7 +25489,7 @@
               </a14:hiddenLine>
             </a:ext>
             <a:ext uri="{AF507438-7753-43e0-B8FC-AC1667EBCBE1}">
-              <a14:hiddenEffects xmlns="" xmlns:a14="http://schemas.microsoft.com/office/drawing/2010/main">
+              <a14:hiddenEffects xmlns:a14="http://schemas.microsoft.com/office/drawing/2010/main" xmlns="">
                 <a:effectLst>
                   <a:outerShdw blurRad="63500" dist="38099" dir="2700000" algn="ctr" rotWithShape="0">
                     <a:schemeClr val="bg2">
@@ -25477,14 +25538,14 @@
           <a:effectLst/>
           <a:extLst>
             <a:ext uri="{909E8E84-426E-40dd-AFC4-6F175D3DCCD1}">
-              <a14:hiddenFill xmlns="" xmlns:a14="http://schemas.microsoft.com/office/drawing/2010/main">
+              <a14:hiddenFill xmlns:a14="http://schemas.microsoft.com/office/drawing/2010/main" xmlns="">
                 <a:solidFill>
                   <a:schemeClr val="accent1"/>
                 </a:solidFill>
               </a14:hiddenFill>
             </a:ext>
             <a:ext uri="{91240B29-F687-4f45-9708-019B960494DF}">
-              <a14:hiddenLine xmlns="" xmlns:a14="http://schemas.microsoft.com/office/drawing/2010/main" w="9525">
+              <a14:hiddenLine xmlns:a14="http://schemas.microsoft.com/office/drawing/2010/main" xmlns="" w="9525">
                 <a:solidFill>
                   <a:schemeClr val="tx1"/>
                 </a:solidFill>
@@ -25494,7 +25555,7 @@
               </a14:hiddenLine>
             </a:ext>
             <a:ext uri="{AF507438-7753-43e0-B8FC-AC1667EBCBE1}">
-              <a14:hiddenEffects xmlns="" xmlns:a14="http://schemas.microsoft.com/office/drawing/2010/main">
+              <a14:hiddenEffects xmlns:a14="http://schemas.microsoft.com/office/drawing/2010/main" xmlns="">
                 <a:effectLst>
                   <a:outerShdw blurRad="63500" dist="38099" dir="2700000" algn="ctr" rotWithShape="0">
                     <a:schemeClr val="bg2">
@@ -25534,7 +25595,7 @@
           </a:ln>
           <a:extLst>
             <a:ext uri="{91240B29-F687-4f45-9708-019B960494DF}">
-              <a14:hiddenLine xmlns="" xmlns:a14="http://schemas.microsoft.com/office/drawing/2010/main" w="9525">
+              <a14:hiddenLine xmlns:a14="http://schemas.microsoft.com/office/drawing/2010/main" xmlns="" w="9525">
                 <a:solidFill>
                   <a:srgbClr val="000000"/>
                 </a:solidFill>
@@ -25771,14 +25832,14 @@
           <a:ln/>
           <a:extLst>
             <a:ext uri="{909E8E84-426E-40dd-AFC4-6F175D3DCCD1}">
-              <a14:hiddenFill xmlns="" xmlns:a14="http://schemas.microsoft.com/office/drawing/2010/main">
+              <a14:hiddenFill xmlns:a14="http://schemas.microsoft.com/office/drawing/2010/main" xmlns="">
                 <a:solidFill>
                   <a:srgbClr val="FFFFFF"/>
                 </a:solidFill>
               </a14:hiddenFill>
             </a:ext>
             <a:ext uri="{91240B29-F687-4f45-9708-019B960494DF}">
-              <a14:hiddenLine xmlns="" xmlns:a14="http://schemas.microsoft.com/office/drawing/2010/main" w="9525">
+              <a14:hiddenLine xmlns:a14="http://schemas.microsoft.com/office/drawing/2010/main" xmlns="" w="9525">
                 <a:solidFill>
                   <a:srgbClr val="000000"/>
                 </a:solidFill>
@@ -29828,14 +29889,14 @@
           <a:ln/>
           <a:extLst>
             <a:ext uri="{909E8E84-426E-40dd-AFC4-6F175D3DCCD1}">
-              <a14:hiddenFill xmlns="" xmlns:a14="http://schemas.microsoft.com/office/drawing/2010/main">
+              <a14:hiddenFill xmlns:a14="http://schemas.microsoft.com/office/drawing/2010/main" xmlns="">
                 <a:solidFill>
                   <a:srgbClr val="FFFFFF"/>
                 </a:solidFill>
               </a14:hiddenFill>
             </a:ext>
             <a:ext uri="{91240B29-F687-4f45-9708-019B960494DF}">
-              <a14:hiddenLine xmlns="" xmlns:a14="http://schemas.microsoft.com/office/drawing/2010/main" w="9525">
+              <a14:hiddenLine xmlns:a14="http://schemas.microsoft.com/office/drawing/2010/main" xmlns="" w="9525">
                 <a:solidFill>
                   <a:srgbClr val="000000"/>
                 </a:solidFill>
@@ -45370,14 +45431,14 @@
           <a:ln/>
           <a:extLst>
             <a:ext uri="{909E8E84-426E-40dd-AFC4-6F175D3DCCD1}">
-              <a14:hiddenFill xmlns:a14="http://schemas.microsoft.com/office/drawing/2010/main" xmlns="">
+              <a14:hiddenFill xmlns="" xmlns:a14="http://schemas.microsoft.com/office/drawing/2010/main">
                 <a:solidFill>
                   <a:srgbClr val="FFFFFF"/>
                 </a:solidFill>
               </a14:hiddenFill>
             </a:ext>
             <a:ext uri="{91240B29-F687-4f45-9708-019B960494DF}">
-              <a14:hiddenLine xmlns:a14="http://schemas.microsoft.com/office/drawing/2010/main" xmlns="" w="9525">
+              <a14:hiddenLine xmlns="" xmlns:a14="http://schemas.microsoft.com/office/drawing/2010/main" w="9525">
                 <a:solidFill>
                   <a:srgbClr val="000000"/>
                 </a:solidFill>
@@ -51018,14 +51079,14 @@
           <a:ln/>
           <a:extLst>
             <a:ext uri="{909E8E84-426E-40dd-AFC4-6F175D3DCCD1}">
-              <a14:hiddenFill xmlns:a14="http://schemas.microsoft.com/office/drawing/2010/main" xmlns="">
+              <a14:hiddenFill xmlns="" xmlns:a14="http://schemas.microsoft.com/office/drawing/2010/main">
                 <a:solidFill>
                   <a:srgbClr val="FFFFFF"/>
                 </a:solidFill>
               </a14:hiddenFill>
             </a:ext>
             <a:ext uri="{91240B29-F687-4f45-9708-019B960494DF}">
-              <a14:hiddenLine xmlns:a14="http://schemas.microsoft.com/office/drawing/2010/main" xmlns="" w="9525">
+              <a14:hiddenLine xmlns="" xmlns:a14="http://schemas.microsoft.com/office/drawing/2010/main" w="9525">
                 <a:solidFill>
                   <a:srgbClr val="000000"/>
                 </a:solidFill>

</xml_diff>